<commit_message>
Added remote state example
</commit_message>
<xml_diff>
--- a/Introduction to Terraform.pptx
+++ b/Introduction to Terraform.pptx
@@ -347,7 +347,7 @@
             <a:fld id="{B61BEF0D-F0BB-DE4B-95CE-6DB70DBA9567}" type="datetimeFigureOut">
               <a:rPr lang="en-US" dirty="0"/>
               <a:pPr/>
-              <a:t>11/11/2021</a:t>
+              <a:t>11/12/2021</a:t>
             </a:fld>
             <a:endParaRPr lang="en-US" dirty="0"/>
           </a:p>
@@ -678,7 +678,7 @@
             <a:fld id="{B61BEF0D-F0BB-DE4B-95CE-6DB70DBA9567}" type="datetimeFigureOut">
               <a:rPr lang="en-US" dirty="0"/>
               <a:pPr/>
-              <a:t>11/11/2021</a:t>
+              <a:t>11/12/2021</a:t>
             </a:fld>
             <a:endParaRPr lang="en-US" dirty="0"/>
           </a:p>
@@ -953,7 +953,7 @@
             <a:fld id="{B61BEF0D-F0BB-DE4B-95CE-6DB70DBA9567}" type="datetimeFigureOut">
               <a:rPr lang="en-US" dirty="0"/>
               <a:pPr/>
-              <a:t>11/11/2021</a:t>
+              <a:t>11/12/2021</a:t>
             </a:fld>
             <a:endParaRPr lang="en-US" dirty="0"/>
           </a:p>
@@ -1518,7 +1518,7 @@
             <a:fld id="{B61BEF0D-F0BB-DE4B-95CE-6DB70DBA9567}" type="datetimeFigureOut">
               <a:rPr lang="en-US" dirty="0"/>
               <a:pPr/>
-              <a:t>11/11/2021</a:t>
+              <a:t>11/12/2021</a:t>
             </a:fld>
             <a:endParaRPr lang="en-US" dirty="0"/>
           </a:p>
@@ -1793,7 +1793,7 @@
             <a:fld id="{B61BEF0D-F0BB-DE4B-95CE-6DB70DBA9567}" type="datetimeFigureOut">
               <a:rPr lang="en-US" dirty="0"/>
               <a:pPr/>
-              <a:t>11/11/2021</a:t>
+              <a:t>11/12/2021</a:t>
             </a:fld>
             <a:endParaRPr lang="en-US" dirty="0"/>
           </a:p>
@@ -2352,7 +2352,7 @@
             <a:fld id="{B61BEF0D-F0BB-DE4B-95CE-6DB70DBA9567}" type="datetimeFigureOut">
               <a:rPr lang="en-US" dirty="0"/>
               <a:pPr/>
-              <a:t>11/11/2021</a:t>
+              <a:t>11/12/2021</a:t>
             </a:fld>
             <a:endParaRPr lang="en-US" dirty="0"/>
           </a:p>
@@ -2676,7 +2676,7 @@
             <a:fld id="{B61BEF0D-F0BB-DE4B-95CE-6DB70DBA9567}" type="datetimeFigureOut">
               <a:rPr lang="en-US" dirty="0"/>
               <a:pPr/>
-              <a:t>11/11/2021</a:t>
+              <a:t>11/12/2021</a:t>
             </a:fld>
             <a:endParaRPr lang="en-US" dirty="0"/>
           </a:p>
@@ -2878,7 +2878,7 @@
             <a:fld id="{B61BEF0D-F0BB-DE4B-95CE-6DB70DBA9567}" type="datetimeFigureOut">
               <a:rPr lang="en-US" dirty="0"/>
               <a:pPr/>
-              <a:t>11/11/2021</a:t>
+              <a:t>11/12/2021</a:t>
             </a:fld>
             <a:endParaRPr lang="en-US" dirty="0"/>
           </a:p>
@@ -3085,7 +3085,7 @@
             <a:fld id="{B61BEF0D-F0BB-DE4B-95CE-6DB70DBA9567}" type="datetimeFigureOut">
               <a:rPr lang="en-US" dirty="0"/>
               <a:pPr/>
-              <a:t>11/11/2021</a:t>
+              <a:t>11/12/2021</a:t>
             </a:fld>
             <a:endParaRPr lang="en-US" dirty="0"/>
           </a:p>
@@ -3282,7 +3282,7 @@
             <a:fld id="{B61BEF0D-F0BB-DE4B-95CE-6DB70DBA9567}" type="datetimeFigureOut">
               <a:rPr lang="en-US" dirty="0"/>
               <a:pPr/>
-              <a:t>11/11/2021</a:t>
+              <a:t>11/12/2021</a:t>
             </a:fld>
             <a:endParaRPr lang="en-US" dirty="0"/>
           </a:p>
@@ -3555,7 +3555,7 @@
             <a:fld id="{B61BEF0D-F0BB-DE4B-95CE-6DB70DBA9567}" type="datetimeFigureOut">
               <a:rPr lang="en-US" dirty="0"/>
               <a:pPr/>
-              <a:t>11/11/2021</a:t>
+              <a:t>11/12/2021</a:t>
             </a:fld>
             <a:endParaRPr lang="en-US" dirty="0"/>
           </a:p>
@@ -3818,7 +3818,7 @@
             <a:fld id="{B61BEF0D-F0BB-DE4B-95CE-6DB70DBA9567}" type="datetimeFigureOut">
               <a:rPr lang="en-US" dirty="0"/>
               <a:pPr/>
-              <a:t>11/11/2021</a:t>
+              <a:t>11/12/2021</a:t>
             </a:fld>
             <a:endParaRPr lang="en-US" dirty="0"/>
           </a:p>
@@ -4189,7 +4189,7 @@
             <a:fld id="{B61BEF0D-F0BB-DE4B-95CE-6DB70DBA9567}" type="datetimeFigureOut">
               <a:rPr lang="en-US" dirty="0"/>
               <a:pPr/>
-              <a:t>11/11/2021</a:t>
+              <a:t>11/12/2021</a:t>
             </a:fld>
             <a:endParaRPr lang="en-US" dirty="0"/>
           </a:p>
@@ -4334,7 +4334,7 @@
             <a:fld id="{B61BEF0D-F0BB-DE4B-95CE-6DB70DBA9567}" type="datetimeFigureOut">
               <a:rPr lang="en-US" dirty="0"/>
               <a:pPr/>
-              <a:t>11/11/2021</a:t>
+              <a:t>11/12/2021</a:t>
             </a:fld>
             <a:endParaRPr lang="en-US" dirty="0"/>
           </a:p>
@@ -4456,7 +4456,7 @@
             <a:fld id="{B61BEF0D-F0BB-DE4B-95CE-6DB70DBA9567}" type="datetimeFigureOut">
               <a:rPr lang="en-US" dirty="0"/>
               <a:pPr/>
-              <a:t>11/11/2021</a:t>
+              <a:t>11/12/2021</a:t>
             </a:fld>
             <a:endParaRPr lang="en-US" dirty="0"/>
           </a:p>
@@ -4738,7 +4738,7 @@
             <a:fld id="{B61BEF0D-F0BB-DE4B-95CE-6DB70DBA9567}" type="datetimeFigureOut">
               <a:rPr lang="en-US" dirty="0"/>
               <a:pPr/>
-              <a:t>11/11/2021</a:t>
+              <a:t>11/12/2021</a:t>
             </a:fld>
             <a:endParaRPr lang="en-US" dirty="0"/>
           </a:p>
@@ -5059,7 +5059,7 @@
             <a:fld id="{B61BEF0D-F0BB-DE4B-95CE-6DB70DBA9567}" type="datetimeFigureOut">
               <a:rPr lang="en-US" dirty="0"/>
               <a:pPr/>
-              <a:t>11/11/2021</a:t>
+              <a:t>11/12/2021</a:t>
             </a:fld>
             <a:endParaRPr lang="en-US" dirty="0"/>
           </a:p>
@@ -5270,7 +5270,7 @@
             <a:fld id="{B61BEF0D-F0BB-DE4B-95CE-6DB70DBA9567}" type="datetimeFigureOut">
               <a:rPr lang="en-US" dirty="0"/>
               <a:pPr/>
-              <a:t>11/11/2021</a:t>
+              <a:t>11/12/2021</a:t>
             </a:fld>
             <a:endParaRPr lang="en-US" dirty="0"/>
           </a:p>
@@ -6250,6 +6250,12 @@
               <a:t>Jake Adams</a:t>
             </a:r>
           </a:p>
+          <a:p>
+            <a:r>
+              <a:rPr lang="en-US" dirty="0"/>
+              <a:t>https://bit.ly/jaketerraform</a:t>
+            </a:r>
+          </a:p>
         </p:txBody>
       </p:sp>
       <p:sp>
@@ -10498,6 +10504,70 @@
                       </p:childTnLst>
                     </p:cTn>
                   </p:par>
+                  <p:par>
+                    <p:cTn id="11" fill="hold">
+                      <p:stCondLst>
+                        <p:cond delay="indefinite"/>
+                      </p:stCondLst>
+                      <p:childTnLst>
+                        <p:par>
+                          <p:cTn id="12" fill="hold">
+                            <p:stCondLst>
+                              <p:cond delay="0"/>
+                            </p:stCondLst>
+                            <p:childTnLst>
+                              <p:par>
+                                <p:cTn id="13" presetID="10" presetClass="entr" presetSubtype="0" fill="hold" grpId="0" nodeType="clickEffect">
+                                  <p:stCondLst>
+                                    <p:cond delay="1500"/>
+                                  </p:stCondLst>
+                                  <p:iterate>
+                                    <p:tmPct val="10000"/>
+                                  </p:iterate>
+                                  <p:childTnLst>
+                                    <p:set>
+                                      <p:cBhvr>
+                                        <p:cTn id="14" dur="1" fill="hold">
+                                          <p:stCondLst>
+                                            <p:cond delay="0"/>
+                                          </p:stCondLst>
+                                        </p:cTn>
+                                        <p:tgtEl>
+                                          <p:spTgt spid="3">
+                                            <p:txEl>
+                                              <p:pRg st="1" end="1"/>
+                                            </p:txEl>
+                                          </p:spTgt>
+                                        </p:tgtEl>
+                                        <p:attrNameLst>
+                                          <p:attrName>style.visibility</p:attrName>
+                                        </p:attrNameLst>
+                                      </p:cBhvr>
+                                      <p:to>
+                                        <p:strVal val="visible"/>
+                                      </p:to>
+                                    </p:set>
+                                    <p:animEffect transition="in" filter="fade">
+                                      <p:cBhvr>
+                                        <p:cTn id="15" dur="700"/>
+                                        <p:tgtEl>
+                                          <p:spTgt spid="3">
+                                            <p:txEl>
+                                              <p:pRg st="1" end="1"/>
+                                            </p:txEl>
+                                          </p:spTgt>
+                                        </p:tgtEl>
+                                      </p:cBhvr>
+                                    </p:animEffect>
+                                  </p:childTnLst>
+                                </p:cTn>
+                              </p:par>
+                            </p:childTnLst>
+                          </p:cTn>
+                        </p:par>
+                      </p:childTnLst>
+                    </p:cTn>
+                  </p:par>
                 </p:childTnLst>
               </p:cTn>
               <p:prevCondLst>
@@ -11322,6 +11392,15 @@
               <a:t>https://learn.hashicorp.com</a:t>
             </a:r>
             <a:endParaRPr lang="en-US" dirty="0"/>
+          </a:p>
+          <a:p>
+            <a:endParaRPr lang="en-US" dirty="0"/>
+          </a:p>
+          <a:p>
+            <a:r>
+              <a:rPr lang="en-US" dirty="0"/>
+              <a:t>Code and Slides - https://bit.ly/jaketerraform</a:t>
+            </a:r>
           </a:p>
           <a:p>
             <a:endParaRPr lang="en-US" dirty="0"/>

</xml_diff>